<commit_message>
updated with NGI logo
</commit_message>
<xml_diff>
--- a/slide_introduction.pptx
+++ b/slide_introduction.pptx
@@ -2333,13 +2333,7 @@
               <a:rPr lang="sv-SE" u="sng" dirty="0">
                 <a:hlinkClick r:id="rId2"/>
               </a:rPr>
-              <a:t> </a:t>
-            </a:r>
-            <a:r>
-              <a:rPr lang="sv-SE" u="sng" dirty="0">
-                <a:hlinkClick r:id="rId2"/>
-              </a:rPr>
-              <a:t>https://www.menti.com/qz4xgxnym3</a:t>
+              <a:t> https://www.menti.com/qz4xgxnym3</a:t>
             </a:r>
             <a:endParaRPr lang="sv-SE" u="sng" dirty="0"/>
           </a:p>
@@ -3820,6 +3814,96 @@
           </a:p>
         </p:txBody>
       </p:sp>
+      <p:sp>
+        <p:nvSpPr>
+          <p:cNvPr id="7" name="Rektangel 6">
+            <a:extLst>
+              <a:ext uri="{FF2B5EF4-FFF2-40B4-BE49-F238E27FC236}">
+                <a16:creationId xmlns:a16="http://schemas.microsoft.com/office/drawing/2014/main" id="{FA1B21DF-EBBD-3C44-B422-317332E3BD50}"/>
+              </a:ext>
+            </a:extLst>
+          </p:cNvPr>
+          <p:cNvSpPr/>
+          <p:nvPr/>
+        </p:nvSpPr>
+        <p:spPr>
+          <a:xfrm>
+            <a:off x="11408186" y="6074228"/>
+            <a:ext cx="751156" cy="762000"/>
+          </a:xfrm>
+          <a:prstGeom prst="rect">
+            <a:avLst/>
+          </a:prstGeom>
+          <a:solidFill>
+            <a:schemeClr val="bg1"/>
+          </a:solidFill>
+          <a:ln>
+            <a:solidFill>
+              <a:schemeClr val="bg1"/>
+            </a:solidFill>
+          </a:ln>
+        </p:spPr>
+        <p:style>
+          <a:lnRef idx="2">
+            <a:schemeClr val="accent1">
+              <a:shade val="50000"/>
+            </a:schemeClr>
+          </a:lnRef>
+          <a:fillRef idx="1">
+            <a:schemeClr val="accent1"/>
+          </a:fillRef>
+          <a:effectRef idx="0">
+            <a:schemeClr val="accent1"/>
+          </a:effectRef>
+          <a:fontRef idx="minor">
+            <a:schemeClr val="lt1"/>
+          </a:fontRef>
+        </p:style>
+        <p:txBody>
+          <a:bodyPr rtlCol="0" anchor="ctr"/>
+          <a:lstStyle/>
+          <a:p>
+            <a:pPr algn="ctr"/>
+            <a:endParaRPr lang="en-GB"/>
+          </a:p>
+        </p:txBody>
+      </p:sp>
+      <p:pic>
+        <p:nvPicPr>
+          <p:cNvPr id="4" name="Bild 3">
+            <a:extLst>
+              <a:ext uri="{FF2B5EF4-FFF2-40B4-BE49-F238E27FC236}">
+                <a16:creationId xmlns:a16="http://schemas.microsoft.com/office/drawing/2014/main" id="{54567FE9-B3A6-F04A-8712-A975D94593BB}"/>
+              </a:ext>
+            </a:extLst>
+          </p:cNvPr>
+          <p:cNvPicPr>
+            <a:picLocks noChangeAspect="1"/>
+          </p:cNvPicPr>
+          <p:nvPr/>
+        </p:nvPicPr>
+        <p:blipFill>
+          <a:blip r:embed="rId6">
+            <a:extLst>
+              <a:ext uri="{96DAC541-7B7A-43D3-8B79-37D633B846F1}">
+                <asvg:svgBlip xmlns:asvg="http://schemas.microsoft.com/office/drawing/2016/SVG/main" r:embed="rId7"/>
+              </a:ext>
+            </a:extLst>
+          </a:blip>
+          <a:stretch>
+            <a:fillRect/>
+          </a:stretch>
+        </p:blipFill>
+        <p:spPr>
+          <a:xfrm>
+            <a:off x="10055269" y="6172028"/>
+            <a:ext cx="2029037" cy="647134"/>
+          </a:xfrm>
+          <a:prstGeom prst="rect">
+            <a:avLst/>
+          </a:prstGeom>
+        </p:spPr>
+      </p:pic>
     </p:spTree>
     <p:extLst>
       <p:ext uri="{BB962C8B-B14F-4D97-AF65-F5344CB8AC3E}">
@@ -4872,115 +4956,94 @@
           </p:spPr>
         </p:pic>
       </p:grpSp>
-      <p:grpSp>
-        <p:nvGrpSpPr>
-          <p:cNvPr id="22" name="Group 21">
+      <p:sp>
+        <p:nvSpPr>
+          <p:cNvPr id="8" name="Right Brace 7">
             <a:extLst>
               <a:ext uri="{FF2B5EF4-FFF2-40B4-BE49-F238E27FC236}">
-                <a16:creationId xmlns:a16="http://schemas.microsoft.com/office/drawing/2014/main" id="{D8E6A2B3-1466-EC44-9658-BACBC26B3906}"/>
+                <a16:creationId xmlns:a16="http://schemas.microsoft.com/office/drawing/2014/main" id="{EC1763E4-D169-D644-B9F1-9138D6D023DD}"/>
               </a:ext>
             </a:extLst>
           </p:cNvPr>
-          <p:cNvGrpSpPr/>
+          <p:cNvSpPr/>
           <p:nvPr/>
-        </p:nvGrpSpPr>
-        <p:grpSpPr>
+        </p:nvSpPr>
+        <p:spPr>
+          <a:xfrm rot="5400000">
+            <a:off x="3345841" y="2530720"/>
+            <a:ext cx="332184" cy="3538166"/>
+          </a:xfrm>
+          <a:prstGeom prst="rightBrace">
+            <a:avLst>
+              <a:gd name="adj1" fmla="val 50222"/>
+              <a:gd name="adj2" fmla="val 50000"/>
+            </a:avLst>
+          </a:prstGeom>
+          <a:ln>
+            <a:solidFill>
+              <a:schemeClr val="tx1"/>
+            </a:solidFill>
+          </a:ln>
+        </p:spPr>
+        <p:style>
+          <a:lnRef idx="2">
+            <a:schemeClr val="accent1"/>
+          </a:lnRef>
+          <a:fillRef idx="0">
+            <a:schemeClr val="accent1"/>
+          </a:fillRef>
+          <a:effectRef idx="1">
+            <a:schemeClr val="accent1"/>
+          </a:effectRef>
+          <a:fontRef idx="minor">
+            <a:schemeClr val="tx1"/>
+          </a:fontRef>
+        </p:style>
+        <p:txBody>
+          <a:bodyPr rtlCol="0" anchor="ctr"/>
+          <a:lstStyle/>
+          <a:p>
+            <a:pPr algn="ctr"/>
+            <a:endParaRPr lang="sv-SE"/>
+          </a:p>
+        </p:txBody>
+      </p:sp>
+      <p:pic>
+        <p:nvPicPr>
+          <p:cNvPr id="11" name="Bild 10">
+            <a:extLst>
+              <a:ext uri="{FF2B5EF4-FFF2-40B4-BE49-F238E27FC236}">
+                <a16:creationId xmlns:a16="http://schemas.microsoft.com/office/drawing/2014/main" id="{316394D5-FC98-F548-90D8-2B4E169D366E}"/>
+              </a:ext>
+            </a:extLst>
+          </p:cNvPr>
+          <p:cNvPicPr>
+            <a:picLocks noChangeAspect="1"/>
+          </p:cNvPicPr>
+          <p:nvPr/>
+        </p:nvPicPr>
+        <p:blipFill>
+          <a:blip r:embed="rId4">
+            <a:extLst>
+              <a:ext uri="{96DAC541-7B7A-43D3-8B79-37D633B846F1}">
+                <asvg:svgBlip xmlns:asvg="http://schemas.microsoft.com/office/drawing/2016/SVG/main" r:embed="rId5"/>
+              </a:ext>
+            </a:extLst>
+          </a:blip>
+          <a:stretch>
+            <a:fillRect/>
+          </a:stretch>
+        </p:blipFill>
+        <p:spPr>
           <a:xfrm>
-            <a:off x="1742850" y="4133711"/>
-            <a:ext cx="3538166" cy="885621"/>
-            <a:chOff x="2053778" y="3940152"/>
-            <a:chExt cx="3538166" cy="885621"/>
+            <a:off x="2197612" y="4534636"/>
+            <a:ext cx="2628642" cy="838371"/>
           </a:xfrm>
-        </p:grpSpPr>
-        <p:sp>
-          <p:nvSpPr>
-            <p:cNvPr id="8" name="Right Brace 7">
-              <a:extLst>
-                <a:ext uri="{FF2B5EF4-FFF2-40B4-BE49-F238E27FC236}">
-                  <a16:creationId xmlns:a16="http://schemas.microsoft.com/office/drawing/2014/main" id="{EC1763E4-D169-D644-B9F1-9138D6D023DD}"/>
-                </a:ext>
-              </a:extLst>
-            </p:cNvPr>
-            <p:cNvSpPr/>
-            <p:nvPr/>
-          </p:nvSpPr>
-          <p:spPr>
-            <a:xfrm rot="5400000">
-              <a:off x="3656769" y="2337161"/>
-              <a:ext cx="332184" cy="3538166"/>
-            </a:xfrm>
-            <a:prstGeom prst="rightBrace">
-              <a:avLst>
-                <a:gd name="adj1" fmla="val 50222"/>
-                <a:gd name="adj2" fmla="val 50000"/>
-              </a:avLst>
-            </a:prstGeom>
-            <a:ln>
-              <a:solidFill>
-                <a:schemeClr val="tx1"/>
-              </a:solidFill>
-            </a:ln>
-          </p:spPr>
-          <p:style>
-            <a:lnRef idx="2">
-              <a:schemeClr val="accent1"/>
-            </a:lnRef>
-            <a:fillRef idx="0">
-              <a:schemeClr val="accent1"/>
-            </a:fillRef>
-            <a:effectRef idx="1">
-              <a:schemeClr val="accent1"/>
-            </a:effectRef>
-            <a:fontRef idx="minor">
-              <a:schemeClr val="tx1"/>
-            </a:fontRef>
-          </p:style>
-          <p:txBody>
-            <a:bodyPr rtlCol="0" anchor="ctr"/>
-            <a:lstStyle/>
-            <a:p>
-              <a:pPr algn="ctr"/>
-              <a:endParaRPr lang="sv-SE"/>
-            </a:p>
-          </p:txBody>
-        </p:sp>
-        <p:pic>
-          <p:nvPicPr>
-            <p:cNvPr id="21" name="Picture 20" descr="A picture containing light&#10;&#10;Description automatically generated">
-              <a:extLst>
-                <a:ext uri="{FF2B5EF4-FFF2-40B4-BE49-F238E27FC236}">
-                  <a16:creationId xmlns:a16="http://schemas.microsoft.com/office/drawing/2014/main" id="{77ACB4BF-3C9D-6541-8067-235BF7358C02}"/>
-                </a:ext>
-              </a:extLst>
-            </p:cNvPr>
-            <p:cNvPicPr>
-              <a:picLocks noChangeAspect="1"/>
-            </p:cNvPicPr>
-            <p:nvPr/>
-          </p:nvPicPr>
-          <p:blipFill>
-            <a:blip r:embed="rId4" cstate="hqprint">
-              <a:extLst>
-                <a:ext uri="{28A0092B-C50C-407E-A947-70E740481C1C}">
-                  <a14:useLocalDpi xmlns:a14="http://schemas.microsoft.com/office/drawing/2010/main"/>
-                </a:ext>
-              </a:extLst>
-            </a:blip>
-            <a:stretch>
-              <a:fillRect/>
-            </a:stretch>
-          </p:blipFill>
-          <p:spPr>
-            <a:xfrm>
-              <a:off x="3570070" y="4347669"/>
-              <a:ext cx="505581" cy="478104"/>
-            </a:xfrm>
-            <a:prstGeom prst="rect">
-              <a:avLst/>
-            </a:prstGeom>
-          </p:spPr>
-        </p:pic>
-      </p:grpSp>
+          <a:prstGeom prst="rect">
+            <a:avLst/>
+          </a:prstGeom>
+        </p:spPr>
+      </p:pic>
     </p:spTree>
     <p:extLst>
       <p:ext uri="{BB962C8B-B14F-4D97-AF65-F5344CB8AC3E}">
@@ -5038,33 +5101,6 @@
                                   </p:childTnLst>
                                 </p:cTn>
                               </p:par>
-                              <p:par>
-                                <p:cTn id="7" presetID="1" presetClass="entr" presetSubtype="0" fill="hold" nodeType="withEffect">
-                                  <p:stCondLst>
-                                    <p:cond delay="0"/>
-                                  </p:stCondLst>
-                                  <p:childTnLst>
-                                    <p:set>
-                                      <p:cBhvr>
-                                        <p:cTn id="8" dur="1" fill="hold">
-                                          <p:stCondLst>
-                                            <p:cond delay="0"/>
-                                          </p:stCondLst>
-                                        </p:cTn>
-                                        <p:tgtEl>
-                                          <p:spTgt spid="22"/>
-                                        </p:tgtEl>
-                                        <p:attrNameLst>
-                                          <p:attrName>style.visibility</p:attrName>
-                                        </p:attrNameLst>
-                                      </p:cBhvr>
-                                      <p:to>
-                                        <p:strVal val="visible"/>
-                                      </p:to>
-                                    </p:set>
-                                  </p:childTnLst>
-                                </p:cTn>
-                              </p:par>
                             </p:childTnLst>
                           </p:cTn>
                         </p:par>
@@ -5072,26 +5108,26 @@
                     </p:cTn>
                   </p:par>
                   <p:par>
-                    <p:cTn id="9" fill="hold">
+                    <p:cTn id="7" fill="hold">
                       <p:stCondLst>
                         <p:cond delay="indefinite"/>
                       </p:stCondLst>
                       <p:childTnLst>
                         <p:par>
-                          <p:cTn id="10" fill="hold">
+                          <p:cTn id="8" fill="hold">
                             <p:stCondLst>
                               <p:cond delay="0"/>
                             </p:stCondLst>
                             <p:childTnLst>
                               <p:par>
-                                <p:cTn id="11" presetID="1" presetClass="entr" presetSubtype="0" fill="hold" nodeType="clickEffect">
+                                <p:cTn id="9" presetID="1" presetClass="entr" presetSubtype="0" fill="hold" nodeType="clickEffect">
                                   <p:stCondLst>
                                     <p:cond delay="0"/>
                                   </p:stCondLst>
                                   <p:childTnLst>
                                     <p:set>
                                       <p:cBhvr>
-                                        <p:cTn id="12" dur="1" fill="hold">
+                                        <p:cTn id="10" dur="1" fill="hold">
                                           <p:stCondLst>
                                             <p:cond delay="0"/>
                                           </p:stCondLst>
@@ -6317,23 +6353,23 @@
           <a:p>
             <a:r>
               <a:rPr lang="en-US" sz="2000" dirty="0"/>
-              <a:t>Check the course calendar here: </a:t>
-            </a:r>
-            <a:r>
-              <a:rPr lang="en-US" sz="2000" dirty="0">
-                <a:solidFill>
-                  <a:srgbClr val="045C64"/>
-                </a:solidFill>
-                <a:hlinkClick r:id="rId2">
-                  <a:extLst>
-                    <a:ext uri="{A12FA001-AC4F-418D-AE19-62706E023703}">
-                      <ahyp:hlinkClr xmlns:ahyp="http://schemas.microsoft.com/office/drawing/2018/hyperlinkcolor" val="tx"/>
-                    </a:ext>
-                  </a:extLst>
-                </a:hlinkClick>
+              <a:t>Check out our training catalogue</a:t>
+            </a:r>
+            <a:r>
+              <a:rPr lang="en-US" dirty="0"/>
+              <a:t>: </a:t>
+            </a:r>
+          </a:p>
+          <a:p>
+            <a:r>
+              <a:rPr lang="en-US" dirty="0">
+                <a:hlinkClick r:id="rId2"/>
               </a:rPr>
-              <a:t>https://nbis.se/training/events.html</a:t>
-            </a:r>
+              <a:t>https://uppsala.instructure.com/courses/48087/pages/nbis-training-catalogue</a:t>
+            </a:r>
+            <a:endParaRPr lang="en-US" dirty="0"/>
+          </a:p>
+          <a:p>
             <a:endParaRPr lang="en-SE" sz="2000" dirty="0">
               <a:solidFill>
                 <a:srgbClr val="045C64"/>

</xml_diff>

<commit_message>
Malins updates on Friday, some info is missing
</commit_message>
<xml_diff>
--- a/slide_introduction.pptx
+++ b/slide_introduction.pptx
@@ -5,10 +5,10 @@
     <p:sldMasterId id="2147483869" r:id="rId1"/>
   </p:sldMasterIdLst>
   <p:notesMasterIdLst>
-    <p:notesMasterId r:id="rId14"/>
+    <p:notesMasterId r:id="rId16"/>
   </p:notesMasterIdLst>
   <p:handoutMasterIdLst>
-    <p:handoutMasterId r:id="rId15"/>
+    <p:handoutMasterId r:id="rId17"/>
   </p:handoutMasterIdLst>
   <p:sldIdLst>
     <p:sldId id="256" r:id="rId2"/>
@@ -21,8 +21,10 @@
     <p:sldId id="1127" r:id="rId9"/>
     <p:sldId id="1128" r:id="rId10"/>
     <p:sldId id="1129" r:id="rId11"/>
-    <p:sldId id="1130" r:id="rId12"/>
-    <p:sldId id="1133" r:id="rId13"/>
+    <p:sldId id="1135" r:id="rId12"/>
+    <p:sldId id="1134" r:id="rId13"/>
+    <p:sldId id="1136" r:id="rId14"/>
+    <p:sldId id="1133" r:id="rId15"/>
   </p:sldIdLst>
   <p:sldSz cx="12192000" cy="6858000"/>
   <p:notesSz cx="6858000" cy="9144000"/>
@@ -304,7 +306,7 @@
           <a:p>
             <a:fld id="{C3D4F295-D1F4-D54B-BA69-832D96C6432A}" type="datetimeFigureOut">
               <a:rPr lang="en-SE" smtClean="0"/>
-              <a:t>3/25/22</a:t>
+              <a:t>2023-02-03</a:t>
             </a:fld>
             <a:endParaRPr lang="en-SE"/>
           </a:p>
@@ -403,7 +405,7 @@
           <a:p>
             <a:fld id="{1EC88F62-802F-2448-8EA8-1562273BBAF4}" type="datetimeFigureOut">
               <a:rPr lang="en-SE" smtClean="0"/>
-              <a:t>3/25/22</a:t>
+              <a:t>2023-02-03</a:t>
             </a:fld>
             <a:endParaRPr lang="en-SE"/>
           </a:p>
@@ -1008,6 +1010,120 @@
     <p:extLst>
       <p:ext uri="{BB962C8B-B14F-4D97-AF65-F5344CB8AC3E}">
         <p14:creationId xmlns:p14="http://schemas.microsoft.com/office/powerpoint/2010/main" val="1582120909"/>
+      </p:ext>
+    </p:extLst>
+  </p:cSld>
+  <p:clrMapOvr>
+    <a:masterClrMapping/>
+  </p:clrMapOvr>
+</p:notes>
+</file>
+
+<file path=ppt/notesSlides/notesSlide4.xml><?xml version="1.0" encoding="utf-8"?>
+<p:notes xmlns:a="http://schemas.openxmlformats.org/drawingml/2006/main" xmlns:r="http://schemas.openxmlformats.org/officeDocument/2006/relationships" xmlns:p="http://schemas.openxmlformats.org/presentationml/2006/main">
+  <p:cSld>
+    <p:spTree>
+      <p:nvGrpSpPr>
+        <p:cNvPr id="1" name=""/>
+        <p:cNvGrpSpPr/>
+        <p:nvPr/>
+      </p:nvGrpSpPr>
+      <p:grpSpPr>
+        <a:xfrm>
+          <a:off x="0" y="0"/>
+          <a:ext cx="0" cy="0"/>
+          <a:chOff x="0" y="0"/>
+          <a:chExt cx="0" cy="0"/>
+        </a:xfrm>
+      </p:grpSpPr>
+      <p:sp>
+        <p:nvSpPr>
+          <p:cNvPr id="2" name="Slide Image Placeholder 1"/>
+          <p:cNvSpPr>
+            <a:spLocks noGrp="1" noRot="1" noChangeAspect="1"/>
+          </p:cNvSpPr>
+          <p:nvPr>
+            <p:ph type="sldImg"/>
+          </p:nvPr>
+        </p:nvSpPr>
+        <p:spPr/>
+      </p:sp>
+      <p:sp>
+        <p:nvSpPr>
+          <p:cNvPr id="3" name="Notes Placeholder 2"/>
+          <p:cNvSpPr>
+            <a:spLocks noGrp="1"/>
+          </p:cNvSpPr>
+          <p:nvPr>
+            <p:ph type="body" idx="1"/>
+          </p:nvPr>
+        </p:nvSpPr>
+        <p:spPr/>
+        <p:txBody>
+          <a:bodyPr/>
+          <a:lstStyle/>
+          <a:p>
+            <a:r>
+              <a:rPr lang="en-GB" b="0" i="0" dirty="0">
+                <a:solidFill>
+                  <a:srgbClr val="1D1C1D"/>
+                </a:solidFill>
+                <a:effectLst/>
+                <a:latin typeface="Slack-Lato"/>
+              </a:rPr>
+              <a:t>We can add that in case someone needs to miss a part of the workshop please talk with us beforehand. Then we will take note of this and tell you how to compensate for the absence i.e. by watching the </a:t>
+            </a:r>
+            <a:r>
+              <a:rPr lang="en-GB" b="0" i="0" dirty="0" err="1">
+                <a:solidFill>
+                  <a:srgbClr val="1D1C1D"/>
+                </a:solidFill>
+                <a:effectLst/>
+                <a:latin typeface="Slack-Lato"/>
+              </a:rPr>
+              <a:t>prerecorded</a:t>
+            </a:r>
+            <a:r>
+              <a:rPr lang="en-GB" b="0" i="0" dirty="0">
+                <a:solidFill>
+                  <a:srgbClr val="1D1C1D"/>
+                </a:solidFill>
+                <a:effectLst/>
+                <a:latin typeface="Slack-Lato"/>
+              </a:rPr>
+              <a:t> video and run the lab on your own.</a:t>
+            </a:r>
+            <a:endParaRPr lang="en-SE" dirty="0"/>
+          </a:p>
+        </p:txBody>
+      </p:sp>
+      <p:sp>
+        <p:nvSpPr>
+          <p:cNvPr id="4" name="Slide Number Placeholder 3"/>
+          <p:cNvSpPr>
+            <a:spLocks noGrp="1"/>
+          </p:cNvSpPr>
+          <p:nvPr>
+            <p:ph type="sldNum" sz="quarter" idx="5"/>
+          </p:nvPr>
+        </p:nvSpPr>
+        <p:spPr/>
+        <p:txBody>
+          <a:bodyPr/>
+          <a:lstStyle/>
+          <a:p>
+            <a:fld id="{DA3BA1A2-6287-9245-9FC9-020813467484}" type="slidenum">
+              <a:rPr lang="en-SE" smtClean="0"/>
+              <a:t>11</a:t>
+            </a:fld>
+            <a:endParaRPr lang="en-SE"/>
+          </a:p>
+        </p:txBody>
+      </p:sp>
+    </p:spTree>
+    <p:extLst>
+      <p:ext uri="{BB962C8B-B14F-4D97-AF65-F5344CB8AC3E}">
+        <p14:creationId xmlns:p14="http://schemas.microsoft.com/office/powerpoint/2010/main" val="2165075708"/>
       </p:ext>
     </p:extLst>
   </p:cSld>
@@ -1475,8 +1591,14 @@
           <p:nvPr userDrawn="1"/>
         </p:nvPicPr>
         <p:blipFill rotWithShape="1">
-          <a:blip r:embed="rId3"/>
-          <a:srcRect b="30886"/>
+          <a:blip r:embed="rId3">
+            <a:extLst>
+              <a:ext uri="{28A0092B-C50C-407E-A947-70E740481C1C}">
+                <a14:useLocalDpi xmlns:a14="http://schemas.microsoft.com/office/drawing/2010/main"/>
+              </a:ext>
+            </a:extLst>
+          </a:blip>
+          <a:srcRect/>
           <a:stretch/>
         </p:blipFill>
         <p:spPr>
@@ -2001,7 +2123,7 @@
               <a:rPr lang="sv-SE" dirty="0"/>
               <a:t> NGS data</a:t>
             </a:r>
-            <a:endParaRPr lang="en-SE"/>
+            <a:endParaRPr lang="en-SE" dirty="0"/>
           </a:p>
         </p:txBody>
       </p:sp>
@@ -2039,7 +2161,7 @@
           <a:p>
             <a:r>
               <a:rPr lang="sv-SE" dirty="0"/>
-              <a:t>2022-03-28</a:t>
+              <a:t>2023-02-06</a:t>
             </a:r>
           </a:p>
         </p:txBody>
@@ -2092,7 +2214,7 @@
         </p:nvSpPr>
         <p:spPr>
           <a:xfrm>
-            <a:off x="1755931" y="1809771"/>
+            <a:off x="431209" y="1241059"/>
             <a:ext cx="8680133" cy="2992407"/>
           </a:xfrm>
         </p:spPr>
@@ -2105,9 +2227,34 @@
               <a:buChar char="•"/>
             </a:pPr>
             <a:r>
-              <a:rPr lang="en-GB" dirty="0"/>
-              <a:t>Work in breakout rooms in zoom</a:t>
-            </a:r>
+              <a:rPr lang="en-GB" sz="2400" dirty="0"/>
+              <a:t>Instructions available in Canvas:</a:t>
+            </a:r>
+            <a:endParaRPr lang="en-GB" dirty="0"/>
+          </a:p>
+          <a:p>
+            <a:pPr marL="800100" lvl="1" indent="-342900">
+              <a:buFont typeface="Arial" panose="020B0604020202020204" pitchFamily="34" charset="0"/>
+              <a:buChar char="•"/>
+            </a:pPr>
+            <a:r>
+              <a:rPr lang="en-GB" sz="2000" dirty="0">
+                <a:hlinkClick r:id="rId3"/>
+              </a:rPr>
+              <a:t>https://uppsala.instructure.com/courses/76870</a:t>
+            </a:r>
+            <a:endParaRPr lang="en-GB" sz="2000" dirty="0"/>
+          </a:p>
+          <a:p>
+            <a:pPr marL="800100" lvl="1" indent="-342900">
+              <a:buFont typeface="Arial" panose="020B0604020202020204" pitchFamily="34" charset="0"/>
+              <a:buChar char="•"/>
+            </a:pPr>
+            <a:r>
+              <a:rPr lang="en-GB" sz="2000" dirty="0"/>
+              <a:t>All material listed under “Contents”</a:t>
+            </a:r>
+            <a:endParaRPr lang="en-GB" sz="2400" dirty="0"/>
           </a:p>
           <a:p>
             <a:pPr marL="342900" indent="-342900">
@@ -2115,8 +2262,8 @@
               <a:buChar char="•"/>
             </a:pPr>
             <a:r>
-              <a:rPr lang="en-GB" dirty="0"/>
-              <a:t>Work in pairs because it improves the learning</a:t>
+              <a:rPr lang="en-GB" sz="2400" dirty="0"/>
+              <a:t>Work in pairs because it improves the learning.</a:t>
             </a:r>
           </a:p>
           <a:p>
@@ -2125,91 +2272,9 @@
               <a:buChar char="•"/>
             </a:pPr>
             <a:r>
-              <a:rPr lang="en-GB" dirty="0"/>
-              <a:t>New pair each day / module</a:t>
-            </a:r>
-          </a:p>
-          <a:p>
-            <a:pPr marL="342900" indent="-342900">
-              <a:buFont typeface="Arial" panose="020B0604020202020204" pitchFamily="34" charset="0"/>
-              <a:buChar char="•"/>
-            </a:pPr>
-            <a:r>
-              <a:rPr lang="en-GB" dirty="0"/>
-              <a:t>When you need help: Type “Need help in room xx” in this document:</a:t>
-            </a:r>
-          </a:p>
-          <a:p>
-            <a:pPr marL="342900" indent="-342900">
-              <a:buFont typeface="Arial" panose="020B0604020202020204" pitchFamily="34" charset="0"/>
-              <a:buChar char="•"/>
-            </a:pPr>
-            <a:r>
-              <a:rPr lang="sv-SE" u="sng" dirty="0">
-                <a:hlinkClick r:id="rId3"/>
-              </a:rPr>
-              <a:t>https://hackmd.io/KUSlRPLaRP2vvpyPC_QYyw</a:t>
-            </a:r>
-            <a:endParaRPr lang="sv-SE" u="sng" dirty="0"/>
-          </a:p>
-          <a:p>
-            <a:pPr marL="342900" indent="-342900">
-              <a:buFont typeface="Arial" panose="020B0604020202020204" pitchFamily="34" charset="0"/>
-              <a:buChar char="•"/>
-            </a:pPr>
-            <a:r>
-              <a:rPr lang="sv-SE" dirty="0" err="1"/>
-              <a:t>Then</a:t>
-            </a:r>
-            <a:r>
-              <a:rPr lang="sv-SE" dirty="0"/>
-              <a:t> a </a:t>
-            </a:r>
-            <a:r>
-              <a:rPr lang="sv-SE" dirty="0" err="1"/>
-              <a:t>teacher</a:t>
-            </a:r>
-            <a:r>
-              <a:rPr lang="sv-SE" dirty="0"/>
-              <a:t> </a:t>
-            </a:r>
-            <a:r>
-              <a:rPr lang="sv-SE" dirty="0" err="1"/>
-              <a:t>will</a:t>
-            </a:r>
-            <a:r>
-              <a:rPr lang="sv-SE" dirty="0"/>
-              <a:t> come to </a:t>
-            </a:r>
-            <a:r>
-              <a:rPr lang="sv-SE" dirty="0" err="1"/>
-              <a:t>you</a:t>
-            </a:r>
-            <a:r>
-              <a:rPr lang="sv-SE" dirty="0"/>
-              <a:t> </a:t>
-            </a:r>
-            <a:r>
-              <a:rPr lang="sv-SE" dirty="0" err="1"/>
-              <a:t>room</a:t>
-            </a:r>
-            <a:r>
-              <a:rPr lang="sv-SE" dirty="0"/>
-              <a:t> and </a:t>
-            </a:r>
-            <a:r>
-              <a:rPr lang="sv-SE" dirty="0" err="1"/>
-              <a:t>help</a:t>
-            </a:r>
-            <a:r>
-              <a:rPr lang="sv-SE" dirty="0"/>
-              <a:t> </a:t>
-            </a:r>
-            <a:r>
-              <a:rPr lang="sv-SE" dirty="0" err="1"/>
-              <a:t>out</a:t>
-            </a:r>
-            <a:endParaRPr lang="sv-SE" dirty="0"/>
+              <a:rPr lang="en-GB" sz="2400" dirty="0"/>
+              <a:t>TAs available in your classroom</a:t>
+            </a:r>
           </a:p>
           <a:p>
             <a:endParaRPr lang="en-GB" dirty="0"/>
@@ -2287,10 +2352,10 @@
       </p:grpSpPr>
       <p:sp>
         <p:nvSpPr>
-          <p:cNvPr id="2" name="Platshållare för innehåll 1">
+          <p:cNvPr id="2" name="Content Placeholder 1">
             <a:extLst>
               <a:ext uri="{FF2B5EF4-FFF2-40B4-BE49-F238E27FC236}">
-                <a16:creationId xmlns:a16="http://schemas.microsoft.com/office/drawing/2014/main" id="{EE4F0428-24A0-EC42-8F50-65060071EA0C}"/>
+                <a16:creationId xmlns:a16="http://schemas.microsoft.com/office/drawing/2014/main" id="{D8A19674-0785-988B-CAE8-B69C6C1D93C5}"/>
               </a:ext>
             </a:extLst>
           </p:cNvPr>
@@ -2301,113 +2366,63 @@
             <p:ph idx="1"/>
           </p:nvPr>
         </p:nvSpPr>
-        <p:spPr>
-          <a:xfrm>
-            <a:off x="1881119" y="2236019"/>
-            <a:ext cx="8429762" cy="3645550"/>
-          </a:xfrm>
-        </p:spPr>
+        <p:spPr/>
         <p:txBody>
-          <a:bodyPr/>
+          <a:bodyPr>
+            <a:normAutofit/>
+          </a:bodyPr>
           <a:lstStyle/>
           <a:p>
             <a:r>
-              <a:rPr lang="en-GB" dirty="0"/>
-              <a:t>Opportunity to discuss your research projects</a:t>
-            </a:r>
-          </a:p>
-          <a:p>
-            <a:r>
-              <a:rPr lang="en-GB" dirty="0"/>
-              <a:t>Discussion topic </a:t>
-            </a:r>
-            <a:r>
-              <a:rPr lang="en-GB" dirty="0" err="1"/>
-              <a:t>servey</a:t>
-            </a:r>
-            <a:r>
-              <a:rPr lang="en-GB" dirty="0"/>
-              <a:t>:</a:t>
-            </a:r>
-            <a:r>
-              <a:rPr lang="sv-SE" u="sng" dirty="0">
-                <a:hlinkClick r:id="rId2"/>
-              </a:rPr>
-              <a:t> https://www.menti.com/qz4xgxnym3</a:t>
-            </a:r>
-            <a:endParaRPr lang="sv-SE" u="sng" dirty="0"/>
-          </a:p>
-          <a:p>
-            <a:r>
-              <a:rPr lang="sv-SE" dirty="0" err="1"/>
-              <a:t>We</a:t>
-            </a:r>
-            <a:r>
-              <a:rPr lang="sv-SE" dirty="0"/>
-              <a:t> </a:t>
-            </a:r>
-            <a:r>
-              <a:rPr lang="sv-SE" dirty="0" err="1"/>
-              <a:t>will</a:t>
-            </a:r>
-            <a:r>
-              <a:rPr lang="sv-SE" dirty="0"/>
-              <a:t> try to </a:t>
-            </a:r>
-            <a:r>
-              <a:rPr lang="sv-SE" dirty="0" err="1"/>
-              <a:t>arrange</a:t>
-            </a:r>
-            <a:r>
-              <a:rPr lang="sv-SE" dirty="0"/>
-              <a:t> </a:t>
-            </a:r>
-            <a:r>
-              <a:rPr lang="sv-SE" dirty="0" err="1"/>
-              <a:t>groups</a:t>
-            </a:r>
-            <a:r>
-              <a:rPr lang="sv-SE" dirty="0"/>
-              <a:t> </a:t>
-            </a:r>
-            <a:r>
-              <a:rPr lang="sv-SE" dirty="0" err="1"/>
-              <a:t>according</a:t>
-            </a:r>
-            <a:r>
-              <a:rPr lang="sv-SE" dirty="0"/>
-              <a:t> to </a:t>
-            </a:r>
-            <a:r>
-              <a:rPr lang="sv-SE" dirty="0" err="1"/>
-              <a:t>your</a:t>
-            </a:r>
-            <a:r>
-              <a:rPr lang="sv-SE" dirty="0"/>
-              <a:t> </a:t>
-            </a:r>
-            <a:r>
-              <a:rPr lang="sv-SE" dirty="0" err="1"/>
-              <a:t>preferred</a:t>
-            </a:r>
-            <a:r>
-              <a:rPr lang="sv-SE" dirty="0"/>
-              <a:t> </a:t>
-            </a:r>
-            <a:r>
-              <a:rPr lang="sv-SE" dirty="0" err="1"/>
-              <a:t>topics</a:t>
-            </a:r>
-            <a:endParaRPr lang="en-GB" dirty="0"/>
+              <a:rPr lang="en-SE" sz="2400" dirty="0"/>
+              <a:t>Those that attend the full workshop* will get a certificate.</a:t>
+            </a:r>
+          </a:p>
+          <a:p>
+            <a:r>
+              <a:rPr lang="en-SE" sz="2400" dirty="0"/>
+              <a:t>	*Attendence at all lectures and labs</a:t>
+            </a:r>
+          </a:p>
+          <a:p>
+            <a:r>
+              <a:rPr lang="en-SE" sz="2400" dirty="0"/>
+              <a:t>	*Labs done (to the basic level)</a:t>
+            </a:r>
+          </a:p>
+          <a:p>
+            <a:r>
+              <a:rPr lang="en-SE" sz="2400"/>
+              <a:t>	*Let us know if you need to miss a session</a:t>
+            </a:r>
+            <a:endParaRPr lang="en-SE" sz="2400" dirty="0"/>
+          </a:p>
+          <a:p>
+            <a:endParaRPr lang="en-SE" sz="2400" dirty="0"/>
+          </a:p>
+          <a:p>
+            <a:r>
+              <a:rPr lang="en-SE" sz="2400" dirty="0"/>
+              <a:t>The certificate will not state number of credits. It will say that this was a full weeks workshop and what topics were covered.</a:t>
+            </a:r>
+          </a:p>
+          <a:p>
+            <a:endParaRPr lang="en-SE" sz="2400" dirty="0"/>
+          </a:p>
+          <a:p>
+            <a:r>
+              <a:rPr lang="en-SE" sz="2400" dirty="0"/>
+              <a:t>Please fill in attendence sheets on the wall!</a:t>
+            </a:r>
           </a:p>
         </p:txBody>
       </p:sp>
       <p:sp>
         <p:nvSpPr>
-          <p:cNvPr id="3" name="Rubrik 2">
+          <p:cNvPr id="3" name="Title 2">
             <a:extLst>
               <a:ext uri="{FF2B5EF4-FFF2-40B4-BE49-F238E27FC236}">
-                <a16:creationId xmlns:a16="http://schemas.microsoft.com/office/drawing/2014/main" id="{4A25B5EF-8496-144B-8A23-95EBC7B85353}"/>
+                <a16:creationId xmlns:a16="http://schemas.microsoft.com/office/drawing/2014/main" id="{1C20F98B-1903-2E1B-1CC1-DFE396E5749F}"/>
               </a:ext>
             </a:extLst>
           </p:cNvPr>
@@ -2426,8 +2441,8 @@
           <a:lstStyle/>
           <a:p>
             <a:r>
-              <a:rPr lang="en-GB" dirty="0"/>
-              <a:t>Open session on Friday afternoon</a:t>
+              <a:rPr lang="en-SE" dirty="0"/>
+              <a:t>Attendence and certificate</a:t>
             </a:r>
           </a:p>
         </p:txBody>
@@ -2435,7 +2450,7 @@
     </p:spTree>
     <p:extLst>
       <p:ext uri="{BB962C8B-B14F-4D97-AF65-F5344CB8AC3E}">
-        <p14:creationId xmlns:p14="http://schemas.microsoft.com/office/powerpoint/2010/main" val="3166990725"/>
+        <p14:creationId xmlns:p14="http://schemas.microsoft.com/office/powerpoint/2010/main" val="4010080424"/>
       </p:ext>
     </p:extLst>
   </p:cSld>
@@ -2446,6 +2461,254 @@
 </file>
 
 <file path=ppt/slides/slide12.xml><?xml version="1.0" encoding="utf-8"?>
+<p:sld xmlns:a="http://schemas.openxmlformats.org/drawingml/2006/main" xmlns:r="http://schemas.openxmlformats.org/officeDocument/2006/relationships" xmlns:p="http://schemas.openxmlformats.org/presentationml/2006/main">
+  <p:cSld>
+    <p:spTree>
+      <p:nvGrpSpPr>
+        <p:cNvPr id="1" name=""/>
+        <p:cNvGrpSpPr/>
+        <p:nvPr/>
+      </p:nvGrpSpPr>
+      <p:grpSpPr>
+        <a:xfrm>
+          <a:off x="0" y="0"/>
+          <a:ext cx="0" cy="0"/>
+          <a:chOff x="0" y="0"/>
+          <a:chExt cx="0" cy="0"/>
+        </a:xfrm>
+      </p:grpSpPr>
+      <p:sp>
+        <p:nvSpPr>
+          <p:cNvPr id="2" name="Content Placeholder 1">
+            <a:extLst>
+              <a:ext uri="{FF2B5EF4-FFF2-40B4-BE49-F238E27FC236}">
+                <a16:creationId xmlns:a16="http://schemas.microsoft.com/office/drawing/2014/main" id="{A59D0C7B-BD22-F2F2-5776-D2C9D947456C}"/>
+              </a:ext>
+            </a:extLst>
+          </p:cNvPr>
+          <p:cNvSpPr>
+            <a:spLocks noGrp="1"/>
+          </p:cNvSpPr>
+          <p:nvPr>
+            <p:ph idx="1"/>
+          </p:nvPr>
+        </p:nvSpPr>
+        <p:spPr>
+          <a:xfrm>
+            <a:off x="1608082" y="1397876"/>
+            <a:ext cx="10152707" cy="4772579"/>
+          </a:xfrm>
+        </p:spPr>
+        <p:txBody>
+          <a:bodyPr>
+            <a:normAutofit/>
+          </a:bodyPr>
+          <a:lstStyle/>
+          <a:p>
+            <a:r>
+              <a:rPr lang="en-SE" sz="2400" dirty="0"/>
+              <a:t>Coffe is ordered for 10:00 and 14:30 every day</a:t>
+            </a:r>
+          </a:p>
+          <a:p>
+            <a:r>
+              <a:rPr lang="en-SE" sz="2400" dirty="0"/>
+              <a:t>May adjust times a bit depending on lectures</a:t>
+            </a:r>
+          </a:p>
+          <a:p>
+            <a:endParaRPr lang="en-SE" sz="2400" dirty="0"/>
+          </a:p>
+          <a:p>
+            <a:r>
+              <a:rPr lang="en-SE" sz="2400" dirty="0"/>
+              <a:t>Lunch booked at 12:00 every day</a:t>
+            </a:r>
+          </a:p>
+          <a:p>
+            <a:r>
+              <a:rPr lang="en-SE" sz="2400" dirty="0"/>
+              <a:t>Uppsala: </a:t>
+            </a:r>
+          </a:p>
+          <a:p>
+            <a:r>
+              <a:rPr lang="en-SE" sz="2400" dirty="0"/>
+              <a:t>Lund:</a:t>
+            </a:r>
+          </a:p>
+          <a:p>
+            <a:r>
+              <a:rPr lang="en-SE" sz="2400" dirty="0"/>
+              <a:t>Umeå</a:t>
+            </a:r>
+          </a:p>
+        </p:txBody>
+      </p:sp>
+      <p:sp>
+        <p:nvSpPr>
+          <p:cNvPr id="3" name="Title 2">
+            <a:extLst>
+              <a:ext uri="{FF2B5EF4-FFF2-40B4-BE49-F238E27FC236}">
+                <a16:creationId xmlns:a16="http://schemas.microsoft.com/office/drawing/2014/main" id="{74A0B91E-463E-527C-F8D7-0CD4E3296134}"/>
+              </a:ext>
+            </a:extLst>
+          </p:cNvPr>
+          <p:cNvSpPr>
+            <a:spLocks noGrp="1"/>
+          </p:cNvSpPr>
+          <p:nvPr>
+            <p:ph type="title"/>
+          </p:nvPr>
+        </p:nvSpPr>
+        <p:spPr/>
+        <p:txBody>
+          <a:bodyPr>
+            <a:normAutofit fontScale="90000"/>
+          </a:bodyPr>
+          <a:lstStyle/>
+          <a:p>
+            <a:r>
+              <a:rPr lang="en-SE" dirty="0"/>
+              <a:t>Breaks</a:t>
+            </a:r>
+          </a:p>
+        </p:txBody>
+      </p:sp>
+    </p:spTree>
+    <p:extLst>
+      <p:ext uri="{BB962C8B-B14F-4D97-AF65-F5344CB8AC3E}">
+        <p14:creationId xmlns:p14="http://schemas.microsoft.com/office/powerpoint/2010/main" val="2063477004"/>
+      </p:ext>
+    </p:extLst>
+  </p:cSld>
+  <p:clrMapOvr>
+    <a:masterClrMapping/>
+  </p:clrMapOvr>
+</p:sld>
+</file>
+
+<file path=ppt/slides/slide13.xml><?xml version="1.0" encoding="utf-8"?>
+<p:sld xmlns:a="http://schemas.openxmlformats.org/drawingml/2006/main" xmlns:r="http://schemas.openxmlformats.org/officeDocument/2006/relationships" xmlns:p="http://schemas.openxmlformats.org/presentationml/2006/main">
+  <p:cSld>
+    <p:spTree>
+      <p:nvGrpSpPr>
+        <p:cNvPr id="1" name=""/>
+        <p:cNvGrpSpPr/>
+        <p:nvPr/>
+      </p:nvGrpSpPr>
+      <p:grpSpPr>
+        <a:xfrm>
+          <a:off x="0" y="0"/>
+          <a:ext cx="0" cy="0"/>
+          <a:chOff x="0" y="0"/>
+          <a:chExt cx="0" cy="0"/>
+        </a:xfrm>
+      </p:grpSpPr>
+      <p:sp>
+        <p:nvSpPr>
+          <p:cNvPr id="2" name="Content Placeholder 1">
+            <a:extLst>
+              <a:ext uri="{FF2B5EF4-FFF2-40B4-BE49-F238E27FC236}">
+                <a16:creationId xmlns:a16="http://schemas.microsoft.com/office/drawing/2014/main" id="{D96A6D82-F9B4-3263-5767-33C81CEE1332}"/>
+              </a:ext>
+            </a:extLst>
+          </p:cNvPr>
+          <p:cNvSpPr>
+            <a:spLocks noGrp="1"/>
+          </p:cNvSpPr>
+          <p:nvPr>
+            <p:ph idx="1"/>
+          </p:nvPr>
+        </p:nvSpPr>
+        <p:spPr/>
+        <p:txBody>
+          <a:bodyPr>
+            <a:normAutofit/>
+          </a:bodyPr>
+          <a:lstStyle/>
+          <a:p>
+            <a:r>
+              <a:rPr lang="en-SE" sz="2400" dirty="0"/>
+              <a:t>Wednesday 18:00</a:t>
+            </a:r>
+          </a:p>
+          <a:p>
+            <a:endParaRPr lang="en-SE" sz="2400" dirty="0"/>
+          </a:p>
+          <a:p>
+            <a:r>
+              <a:rPr lang="en-SE" sz="2400" dirty="0"/>
+              <a:t>Uppsala: Koh Phangan, Fyristorg 2</a:t>
+            </a:r>
+          </a:p>
+          <a:p>
+            <a:r>
+              <a:rPr lang="en-SE" sz="2400" dirty="0"/>
+              <a:t>Lund:</a:t>
+            </a:r>
+          </a:p>
+          <a:p>
+            <a:r>
+              <a:rPr lang="en-SE" sz="2400" dirty="0"/>
+              <a:t>Umeå:</a:t>
+            </a:r>
+          </a:p>
+          <a:p>
+            <a:endParaRPr lang="en-SE" sz="2400" dirty="0"/>
+          </a:p>
+          <a:p>
+            <a:r>
+              <a:rPr lang="en-SE" sz="2400" dirty="0"/>
+              <a:t>Please sign up on the list in the classroom on Monday!</a:t>
+            </a:r>
+          </a:p>
+        </p:txBody>
+      </p:sp>
+      <p:sp>
+        <p:nvSpPr>
+          <p:cNvPr id="3" name="Title 2">
+            <a:extLst>
+              <a:ext uri="{FF2B5EF4-FFF2-40B4-BE49-F238E27FC236}">
+                <a16:creationId xmlns:a16="http://schemas.microsoft.com/office/drawing/2014/main" id="{B89F6912-36F6-CA31-AC72-7539500C7B1B}"/>
+              </a:ext>
+            </a:extLst>
+          </p:cNvPr>
+          <p:cNvSpPr>
+            <a:spLocks noGrp="1"/>
+          </p:cNvSpPr>
+          <p:nvPr>
+            <p:ph type="title"/>
+          </p:nvPr>
+        </p:nvSpPr>
+        <p:spPr/>
+        <p:txBody>
+          <a:bodyPr>
+            <a:normAutofit fontScale="90000"/>
+          </a:bodyPr>
+          <a:lstStyle/>
+          <a:p>
+            <a:r>
+              <a:rPr lang="en-SE" dirty="0"/>
+              <a:t>Course dinner</a:t>
+            </a:r>
+          </a:p>
+        </p:txBody>
+      </p:sp>
+    </p:spTree>
+    <p:extLst>
+      <p:ext uri="{BB962C8B-B14F-4D97-AF65-F5344CB8AC3E}">
+        <p14:creationId xmlns:p14="http://schemas.microsoft.com/office/powerpoint/2010/main" val="2894102020"/>
+      </p:ext>
+    </p:extLst>
+  </p:cSld>
+  <p:clrMapOvr>
+    <a:masterClrMapping/>
+  </p:clrMapOvr>
+</p:sld>
+</file>
+
+<file path=ppt/slides/slide14.xml><?xml version="1.0" encoding="utf-8"?>
 <p:sld xmlns:a="http://schemas.openxmlformats.org/drawingml/2006/main" xmlns:r="http://schemas.openxmlformats.org/officeDocument/2006/relationships" xmlns:p="http://schemas.openxmlformats.org/presentationml/2006/main">
   <p:cSld>
     <p:spTree>
@@ -2837,8 +3100,13 @@
             <p:blipFill rotWithShape="1">
               <a:blip r:embed="rId4">
                 <a:alphaModFix amt="70000"/>
+                <a:extLst>
+                  <a:ext uri="{28A0092B-C50C-407E-A947-70E740481C1C}">
+                    <a14:useLocalDpi xmlns:a14="http://schemas.microsoft.com/office/drawing/2010/main"/>
+                  </a:ext>
+                </a:extLst>
               </a:blip>
-              <a:srcRect l="33353" r="32935"/>
+              <a:srcRect/>
               <a:stretch/>
             </p:blipFill>
             <p:spPr>
@@ -4839,8 +5107,14 @@
             <p:nvPr/>
           </p:nvPicPr>
           <p:blipFill rotWithShape="1">
-            <a:blip r:embed="rId3"/>
-            <a:srcRect b="30886"/>
+            <a:blip r:embed="rId3">
+              <a:extLst>
+                <a:ext uri="{28A0092B-C50C-407E-A947-70E740481C1C}">
+                  <a14:useLocalDpi xmlns:a14="http://schemas.microsoft.com/office/drawing/2010/main"/>
+                </a:ext>
+              </a:extLst>
+            </a:blip>
+            <a:srcRect/>
             <a:stretch/>
           </p:blipFill>
           <p:spPr>
@@ -4941,8 +5215,14 @@
             <p:nvPr/>
           </p:nvPicPr>
           <p:blipFill rotWithShape="1">
-            <a:blip r:embed="rId3"/>
-            <a:srcRect b="30886"/>
+            <a:blip r:embed="rId3">
+              <a:extLst>
+                <a:ext uri="{28A0092B-C50C-407E-A947-70E740481C1C}">
+                  <a14:useLocalDpi xmlns:a14="http://schemas.microsoft.com/office/drawing/2010/main"/>
+                </a:ext>
+              </a:extLst>
+            </a:blip>
+            <a:srcRect/>
             <a:stretch/>
           </p:blipFill>
           <p:spPr>
@@ -5244,7 +5524,7 @@
           <a:blip r:embed="rId2">
             <a:extLst>
               <a:ext uri="{28A0092B-C50C-407E-A947-70E740481C1C}">
-                <a14:useLocalDpi xmlns:a14="http://schemas.microsoft.com/office/drawing/2010/main" val="0"/>
+                <a14:useLocalDpi xmlns:a14="http://schemas.microsoft.com/office/drawing/2010/main"/>
               </a:ext>
             </a:extLst>
           </a:blip>
@@ -5275,35 +5555,6 @@
       </p:pic>
       <p:pic>
         <p:nvPicPr>
-          <p:cNvPr id="5" name="Bildobjekt 4" descr="En bild som visar person, leende&#10;&#10;Automatiskt genererad beskrivning">
-            <a:extLst>
-              <a:ext uri="{FF2B5EF4-FFF2-40B4-BE49-F238E27FC236}">
-                <a16:creationId xmlns:a16="http://schemas.microsoft.com/office/drawing/2014/main" id="{D82D26F7-64C1-5745-BF26-3BB1F8B99730}"/>
-              </a:ext>
-            </a:extLst>
-          </p:cNvPr>
-          <p:cNvPicPr>
-            <a:picLocks noChangeAspect="1"/>
-          </p:cNvPicPr>
-          <p:nvPr/>
-        </p:nvPicPr>
-        <p:blipFill rotWithShape="1">
-          <a:blip r:embed="rId3"/>
-          <a:srcRect l="5625" t="129" r="6483" b="12869"/>
-          <a:stretch/>
-        </p:blipFill>
-        <p:spPr>
-          <a:xfrm>
-            <a:off x="5069205" y="1905000"/>
-            <a:ext cx="2415540" cy="2721510"/>
-          </a:xfrm>
-          <a:prstGeom prst="rect">
-            <a:avLst/>
-          </a:prstGeom>
-        </p:spPr>
-      </p:pic>
-      <p:pic>
-        <p:nvPicPr>
           <p:cNvPr id="1028" name="Picture 4" descr="Martin Dahlö">
             <a:extLst>
               <a:ext uri="{FF2B5EF4-FFF2-40B4-BE49-F238E27FC236}">
@@ -5317,10 +5568,10 @@
           <p:nvPr/>
         </p:nvPicPr>
         <p:blipFill>
-          <a:blip r:embed="rId4">
+          <a:blip r:embed="rId3">
             <a:extLst>
               <a:ext uri="{28A0092B-C50C-407E-A947-70E740481C1C}">
-                <a14:useLocalDpi xmlns:a14="http://schemas.microsoft.com/office/drawing/2010/main" val="0"/>
+                <a14:useLocalDpi xmlns:a14="http://schemas.microsoft.com/office/drawing/2010/main"/>
               </a:ext>
             </a:extLst>
           </a:blip>
@@ -5484,6 +5735,36 @@
           </a:p>
         </p:txBody>
       </p:sp>
+      <p:pic>
+        <p:nvPicPr>
+          <p:cNvPr id="2" name="Picture 1">
+            <a:extLst>
+              <a:ext uri="{FF2B5EF4-FFF2-40B4-BE49-F238E27FC236}">
+                <a16:creationId xmlns:a16="http://schemas.microsoft.com/office/drawing/2014/main" id="{A597DCAC-C52E-0A7C-51E2-E6D4D01B24FB}"/>
+              </a:ext>
+            </a:extLst>
+          </p:cNvPr>
+          <p:cNvPicPr>
+            <a:picLocks noChangeAspect="1"/>
+          </p:cNvPicPr>
+          <p:nvPr/>
+        </p:nvPicPr>
+        <p:blipFill>
+          <a:blip r:embed="rId4"/>
+          <a:stretch>
+            <a:fillRect/>
+          </a:stretch>
+        </p:blipFill>
+        <p:spPr>
+          <a:xfrm>
+            <a:off x="4889500" y="2070100"/>
+            <a:ext cx="2413000" cy="2717800"/>
+          </a:xfrm>
+          <a:prstGeom prst="rect">
+            <a:avLst/>
+          </a:prstGeom>
+        </p:spPr>
+      </p:pic>
     </p:spTree>
     <p:extLst>
       <p:ext uri="{BB962C8B-B14F-4D97-AF65-F5344CB8AC3E}">
@@ -6362,14 +6643,17 @@
           </a:p>
           <a:p>
             <a:r>
-              <a:rPr lang="en-US" dirty="0">
-                <a:hlinkClick r:id="rId2"/>
-              </a:rPr>
-              <a:t>https://uppsala.instructure.com/courses/48087/pages/nbis-training-catalogue</a:t>
-            </a:r>
-            <a:endParaRPr lang="en-US" dirty="0"/>
-          </a:p>
-          <a:p>
+              <a:rPr lang="en-US" dirty="0"/>
+              <a:t>https://</a:t>
+            </a:r>
+            <a:r>
+              <a:rPr lang="en-US" dirty="0" err="1"/>
+              <a:t>uppsala.instructure.com</a:t>
+            </a:r>
+            <a:r>
+              <a:rPr lang="en-US" dirty="0"/>
+              <a:t>/courses/79097</a:t>
+            </a:r>
             <a:endParaRPr lang="en-SE" sz="2000" dirty="0">
               <a:solidFill>
                 <a:srgbClr val="045C64"/>
@@ -6572,8 +6856,8 @@
         </p:nvSpPr>
         <p:spPr>
           <a:xfrm>
-            <a:off x="1693953" y="1982365"/>
-            <a:ext cx="9790476" cy="4222493"/>
+            <a:off x="431208" y="1235233"/>
+            <a:ext cx="11329579" cy="4964845"/>
           </a:xfrm>
         </p:spPr>
         <p:txBody>
@@ -6585,8 +6869,8 @@
               <a:buChar char="•"/>
             </a:pPr>
             <a:r>
-              <a:rPr lang="en-GB" dirty="0"/>
-              <a:t>Live in zoom</a:t>
+              <a:rPr lang="en-GB" sz="2400" dirty="0"/>
+              <a:t>Mainly live in the classroom in Uppsala.</a:t>
             </a:r>
           </a:p>
           <a:p>
@@ -6595,8 +6879,16 @@
               <a:buChar char="•"/>
             </a:pPr>
             <a:r>
-              <a:rPr lang="en-GB" dirty="0"/>
-              <a:t>Please have camera on during lectures</a:t>
+              <a:rPr lang="en-GB" sz="2400" dirty="0"/>
+              <a:t>Streamed via zoom to Lund and </a:t>
+            </a:r>
+            <a:r>
+              <a:rPr lang="en-GB" sz="2400" dirty="0" err="1"/>
+              <a:t>Umeå</a:t>
+            </a:r>
+            <a:r>
+              <a:rPr lang="en-GB" sz="2400" dirty="0"/>
+              <a:t>. </a:t>
             </a:r>
           </a:p>
           <a:p>
@@ -6605,8 +6897,8 @@
               <a:buChar char="•"/>
             </a:pPr>
             <a:r>
-              <a:rPr lang="en-GB" dirty="0"/>
-              <a:t>Have sound muted (except when asking questions)</a:t>
+              <a:rPr lang="en-GB" sz="2400" dirty="0"/>
+              <a:t>Lets help out to make sure that questions are heard in all classrooms!</a:t>
             </a:r>
           </a:p>
           <a:p>
@@ -6615,16 +6907,6 @@
               <a:buChar char="•"/>
             </a:pPr>
             <a:endParaRPr lang="en-GB" dirty="0"/>
-          </a:p>
-          <a:p>
-            <a:pPr marL="342900" indent="-342900">
-              <a:buFont typeface="Arial" panose="020B0604020202020204" pitchFamily="34" charset="0"/>
-              <a:buChar char="•"/>
-            </a:pPr>
-            <a:r>
-              <a:rPr lang="en-GB" dirty="0"/>
-              <a:t>Tuesday 13:15 – 15:15: We will watch a pre-recorded video. Questions can be asked in the main zoom window at 15:15.</a:t>
-            </a:r>
           </a:p>
           <a:p>
             <a:endParaRPr lang="en-GB" dirty="0"/>

</xml_diff>